<commit_message>
add software requirement slides
</commit_message>
<xml_diff>
--- a/docs/final_presentation_candidate.pptx
+++ b/docs/final_presentation_candidate.pptx
@@ -22,6 +22,8 @@
     <p:sldId id="271" r:id="rId16"/>
     <p:sldId id="272" r:id="rId17"/>
     <p:sldId id="273" r:id="rId18"/>
+    <p:sldId id="274" r:id="rId19"/>
+    <p:sldId id="275" r:id="rId20"/>
   </p:sldIdLst>
   <p:sldSz cx="9144000" cy="6858000" type="screen4x3"/>
   <p:notesSz cx="6858000" cy="9144000"/>
@@ -5264,7 +5266,7 @@
     </p:spTree>
     <p:extLst>
       <p:ext uri="{BB962C8B-B14F-4D97-AF65-F5344CB8AC3E}">
-        <p14:creationId xmlns:p14="http://schemas.microsoft.com/office/powerpoint/2010/main" val="1815371728"/>
+        <p14:creationId xmlns:p14="http://schemas.microsoft.com/office/powerpoint/2010/main" val="1118925113"/>
       </p:ext>
     </p:extLst>
   </p:cSld>
@@ -5368,7 +5370,7 @@
     </p:spTree>
     <p:extLst>
       <p:ext uri="{BB962C8B-B14F-4D97-AF65-F5344CB8AC3E}">
-        <p14:creationId xmlns:p14="http://schemas.microsoft.com/office/powerpoint/2010/main" val="3249620437"/>
+        <p14:creationId xmlns:p14="http://schemas.microsoft.com/office/powerpoint/2010/main" val="3084671141"/>
       </p:ext>
     </p:extLst>
   </p:cSld>
@@ -5485,7 +5487,7 @@
     </p:spTree>
     <p:extLst>
       <p:ext uri="{BB962C8B-B14F-4D97-AF65-F5344CB8AC3E}">
-        <p14:creationId xmlns:p14="http://schemas.microsoft.com/office/powerpoint/2010/main" val="239908727"/>
+        <p14:creationId xmlns:p14="http://schemas.microsoft.com/office/powerpoint/2010/main" val="3111049772"/>
       </p:ext>
     </p:extLst>
   </p:cSld>
@@ -5529,21 +5531,50 @@
           <a:p>
             <a:r>
               <a:rPr lang="en-US" dirty="0" smtClean="0"/>
-              <a:t>When a client or device connects to the server, a new thread is spawn to handle and process any data sent</a:t>
-            </a:r>
-          </a:p>
-          <a:p>
+              <a:t>Functional:</a:t>
+            </a:r>
+          </a:p>
+          <a:p>
+            <a:pPr lvl="1"/>
             <a:r>
               <a:rPr lang="en-US" dirty="0" smtClean="0"/>
-              <a:t>Once determined if it’s a client or device, the information is logged into a list, which is constantly updated locally and periodically updated on the database </a:t>
-            </a:r>
-          </a:p>
-          <a:p>
+              <a:t>Server should be robust and be resilient to failure</a:t>
+            </a:r>
+          </a:p>
+          <a:p>
+            <a:pPr lvl="1"/>
             <a:r>
               <a:rPr lang="en-US" dirty="0" smtClean="0"/>
-              <a:t>Client asks the server to assign it a device, once assigned, the server will relay any data from the client to the device</a:t>
-            </a:r>
-            <a:endParaRPr lang="en-US" dirty="0"/>
+              <a:t>Server log messages should be clear on activity</a:t>
+            </a:r>
+          </a:p>
+          <a:p>
+            <a:pPr lvl="1"/>
+            <a:r>
+              <a:rPr lang="en-US" dirty="0" smtClean="0"/>
+              <a:t>Device crashes should not corrupt any part of server</a:t>
+            </a:r>
+          </a:p>
+          <a:p>
+            <a:pPr lvl="1"/>
+            <a:r>
+              <a:rPr lang="en-US" dirty="0" smtClean="0"/>
+              <a:t>Devices may only have one “owner” at any given instance</a:t>
+            </a:r>
+          </a:p>
+          <a:p>
+            <a:pPr lvl="1"/>
+            <a:r>
+              <a:rPr lang="en-US" dirty="0" smtClean="0"/>
+              <a:t>Clients can actively control only one device any given instance</a:t>
+            </a:r>
+          </a:p>
+          <a:p>
+            <a:pPr lvl="1"/>
+            <a:r>
+              <a:rPr lang="en-US" dirty="0" smtClean="0"/>
+              <a:t>Server must be secure against unwarranted input</a:t>
+            </a:r>
           </a:p>
         </p:txBody>
       </p:sp>
@@ -5559,14 +5590,12 @@
         </p:nvSpPr>
         <p:spPr/>
         <p:txBody>
-          <a:bodyPr>
-            <a:normAutofit/>
-          </a:bodyPr>
+          <a:bodyPr/>
           <a:lstStyle/>
           <a:p>
             <a:r>
               <a:rPr lang="en-US" dirty="0" smtClean="0"/>
-              <a:t>Server Implementation</a:t>
+              <a:t>Software Requirements</a:t>
             </a:r>
             <a:endParaRPr lang="en-US" dirty="0"/>
           </a:p>
@@ -5575,7 +5604,7 @@
     </p:spTree>
     <p:extLst>
       <p:ext uri="{BB962C8B-B14F-4D97-AF65-F5344CB8AC3E}">
-        <p14:creationId xmlns:p14="http://schemas.microsoft.com/office/powerpoint/2010/main" val="3437818343"/>
+        <p14:creationId xmlns:p14="http://schemas.microsoft.com/office/powerpoint/2010/main" val="1310860115"/>
       </p:ext>
     </p:extLst>
   </p:cSld>
@@ -5619,27 +5648,44 @@
           <a:p>
             <a:r>
               <a:rPr lang="en-US" dirty="0" smtClean="0"/>
-              <a:t>Server keeps a cached list of available devices and clients</a:t>
-            </a:r>
-          </a:p>
-          <a:p>
+              <a:t>Non-functional:</a:t>
+            </a:r>
+          </a:p>
+          <a:p>
+            <a:pPr lvl="1"/>
             <a:r>
               <a:rPr lang="en-US" dirty="0" smtClean="0"/>
-              <a:t>Makes periodic database writes for web and mobile client access</a:t>
-            </a:r>
-          </a:p>
-          <a:p>
+              <a:t>Real-time devices require near real-time feedback</a:t>
+            </a:r>
+          </a:p>
+          <a:p>
+            <a:pPr lvl="1"/>
             <a:r>
               <a:rPr lang="en-US" dirty="0" smtClean="0"/>
-              <a:t>Database writes can be expensive so only done periodically</a:t>
-            </a:r>
-          </a:p>
-          <a:p>
+              <a:t>Devices should have minimal setup to boot up and connect to server</a:t>
+            </a:r>
+          </a:p>
+          <a:p>
+            <a:pPr lvl="1"/>
             <a:r>
               <a:rPr lang="en-US" dirty="0" smtClean="0"/>
-              <a:t>Internal list needs to be updated in real time so devices aren’t mistakenly claimed</a:t>
-            </a:r>
-            <a:endParaRPr lang="en-US" dirty="0"/>
+              <a:t>System should be responsive under any amount of stress</a:t>
+            </a:r>
+          </a:p>
+          <a:p>
+            <a:pPr lvl="1"/>
+            <a:r>
+              <a:rPr lang="en-US" dirty="0" smtClean="0"/>
+              <a:t>Server deployment should be straight forward</a:t>
+            </a:r>
+          </a:p>
+          <a:p>
+            <a:pPr lvl="1"/>
+            <a:endParaRPr lang="en-US" dirty="0" smtClean="0"/>
+          </a:p>
+          <a:p>
+            <a:pPr lvl="1"/>
+            <a:endParaRPr lang="en-US" dirty="0" smtClean="0"/>
           </a:p>
         </p:txBody>
       </p:sp>
@@ -5659,16 +5705,17 @@
           <a:lstStyle/>
           <a:p>
             <a:r>
-              <a:rPr lang="en-US" dirty="0"/>
-              <a:t>Server Implementation</a:t>
-            </a:r>
+              <a:rPr lang="en-US" dirty="0" smtClean="0"/>
+              <a:t>Software Requirements</a:t>
+            </a:r>
+            <a:endParaRPr lang="en-US" dirty="0"/>
           </a:p>
         </p:txBody>
       </p:sp>
     </p:spTree>
     <p:extLst>
       <p:ext uri="{BB962C8B-B14F-4D97-AF65-F5344CB8AC3E}">
-        <p14:creationId xmlns:p14="http://schemas.microsoft.com/office/powerpoint/2010/main" val="1463393360"/>
+        <p14:creationId xmlns:p14="http://schemas.microsoft.com/office/powerpoint/2010/main" val="2487975549"/>
       </p:ext>
     </p:extLst>
   </p:cSld>
@@ -5712,10 +5759,20 @@
           <a:p>
             <a:r>
               <a:rPr lang="en-US" dirty="0" smtClean="0"/>
-              <a:t>Expanding and extending the functionality of the API can be difficult, server can store what available commands exist for a certain device, but the user interface cannot dynamically translate commands into a practical layout </a:t>
-            </a:r>
-          </a:p>
-          <a:p>
+              <a:t>When a client or device connects to the server, a new thread is spawn to handle and process any data sent</a:t>
+            </a:r>
+          </a:p>
+          <a:p>
+            <a:r>
+              <a:rPr lang="en-US" dirty="0" smtClean="0"/>
+              <a:t>Once determined if it’s a client or device, the information is logged into a list, which is constantly updated locally and periodically updated on the database </a:t>
+            </a:r>
+          </a:p>
+          <a:p>
+            <a:r>
+              <a:rPr lang="en-US" dirty="0" smtClean="0"/>
+              <a:t>Client asks the server to assign it a device, once assigned, the server will relay any data from the client to the device</a:t>
+            </a:r>
             <a:endParaRPr lang="en-US" dirty="0"/>
           </a:p>
         </p:txBody>
@@ -5732,12 +5789,14 @@
         </p:nvSpPr>
         <p:spPr/>
         <p:txBody>
-          <a:bodyPr/>
+          <a:bodyPr>
+            <a:normAutofit/>
+          </a:bodyPr>
           <a:lstStyle/>
           <a:p>
             <a:r>
               <a:rPr lang="en-US" dirty="0" smtClean="0"/>
-              <a:t>Server Issues</a:t>
+              <a:t>Server Implementation</a:t>
             </a:r>
             <a:endParaRPr lang="en-US" dirty="0"/>
           </a:p>
@@ -5746,7 +5805,178 @@
     </p:spTree>
     <p:extLst>
       <p:ext uri="{BB962C8B-B14F-4D97-AF65-F5344CB8AC3E}">
-        <p14:creationId xmlns:p14="http://schemas.microsoft.com/office/powerpoint/2010/main" val="4152842642"/>
+        <p14:creationId xmlns:p14="http://schemas.microsoft.com/office/powerpoint/2010/main" val="2047166015"/>
+      </p:ext>
+    </p:extLst>
+  </p:cSld>
+  <p:clrMapOvr>
+    <a:masterClrMapping/>
+  </p:clrMapOvr>
+</p:sld>
+</file>
+
+<file path=ppt/slides/slide18.xml><?xml version="1.0" encoding="utf-8"?>
+<p:sld xmlns:a="http://schemas.openxmlformats.org/drawingml/2006/main" xmlns:r="http://schemas.openxmlformats.org/officeDocument/2006/relationships" xmlns:p="http://schemas.openxmlformats.org/presentationml/2006/main">
+  <p:cSld>
+    <p:spTree>
+      <p:nvGrpSpPr>
+        <p:cNvPr id="1" name=""/>
+        <p:cNvGrpSpPr/>
+        <p:nvPr/>
+      </p:nvGrpSpPr>
+      <p:grpSpPr>
+        <a:xfrm>
+          <a:off x="0" y="0"/>
+          <a:ext cx="0" cy="0"/>
+          <a:chOff x="0" y="0"/>
+          <a:chExt cx="0" cy="0"/>
+        </a:xfrm>
+      </p:grpSpPr>
+      <p:sp>
+        <p:nvSpPr>
+          <p:cNvPr id="2" name="Content Placeholder 1"/>
+          <p:cNvSpPr>
+            <a:spLocks noGrp="1"/>
+          </p:cNvSpPr>
+          <p:nvPr>
+            <p:ph idx="1"/>
+          </p:nvPr>
+        </p:nvSpPr>
+        <p:spPr/>
+        <p:txBody>
+          <a:bodyPr/>
+          <a:lstStyle/>
+          <a:p>
+            <a:r>
+              <a:rPr lang="en-US" dirty="0" smtClean="0"/>
+              <a:t>Server keeps a cached list of available devices and clients</a:t>
+            </a:r>
+          </a:p>
+          <a:p>
+            <a:r>
+              <a:rPr lang="en-US" dirty="0" smtClean="0"/>
+              <a:t>Makes periodic database writes for web and mobile client access</a:t>
+            </a:r>
+          </a:p>
+          <a:p>
+            <a:r>
+              <a:rPr lang="en-US" dirty="0" smtClean="0"/>
+              <a:t>Database writes can be expensive so only done periodically</a:t>
+            </a:r>
+          </a:p>
+          <a:p>
+            <a:r>
+              <a:rPr lang="en-US" dirty="0" smtClean="0"/>
+              <a:t>Internal list needs to be updated in real time so devices aren’t mistakenly claimed</a:t>
+            </a:r>
+            <a:endParaRPr lang="en-US" dirty="0"/>
+          </a:p>
+        </p:txBody>
+      </p:sp>
+      <p:sp>
+        <p:nvSpPr>
+          <p:cNvPr id="3" name="Title 2"/>
+          <p:cNvSpPr>
+            <a:spLocks noGrp="1"/>
+          </p:cNvSpPr>
+          <p:nvPr>
+            <p:ph type="title"/>
+          </p:nvPr>
+        </p:nvSpPr>
+        <p:spPr/>
+        <p:txBody>
+          <a:bodyPr/>
+          <a:lstStyle/>
+          <a:p>
+            <a:r>
+              <a:rPr lang="en-US" dirty="0"/>
+              <a:t>Server Implementation</a:t>
+            </a:r>
+          </a:p>
+        </p:txBody>
+      </p:sp>
+    </p:spTree>
+    <p:extLst>
+      <p:ext uri="{BB962C8B-B14F-4D97-AF65-F5344CB8AC3E}">
+        <p14:creationId xmlns:p14="http://schemas.microsoft.com/office/powerpoint/2010/main" val="2483293559"/>
+      </p:ext>
+    </p:extLst>
+  </p:cSld>
+  <p:clrMapOvr>
+    <a:masterClrMapping/>
+  </p:clrMapOvr>
+</p:sld>
+</file>
+
+<file path=ppt/slides/slide19.xml><?xml version="1.0" encoding="utf-8"?>
+<p:sld xmlns:a="http://schemas.openxmlformats.org/drawingml/2006/main" xmlns:r="http://schemas.openxmlformats.org/officeDocument/2006/relationships" xmlns:p="http://schemas.openxmlformats.org/presentationml/2006/main">
+  <p:cSld>
+    <p:spTree>
+      <p:nvGrpSpPr>
+        <p:cNvPr id="1" name=""/>
+        <p:cNvGrpSpPr/>
+        <p:nvPr/>
+      </p:nvGrpSpPr>
+      <p:grpSpPr>
+        <a:xfrm>
+          <a:off x="0" y="0"/>
+          <a:ext cx="0" cy="0"/>
+          <a:chOff x="0" y="0"/>
+          <a:chExt cx="0" cy="0"/>
+        </a:xfrm>
+      </p:grpSpPr>
+      <p:sp>
+        <p:nvSpPr>
+          <p:cNvPr id="2" name="Content Placeholder 1"/>
+          <p:cNvSpPr>
+            <a:spLocks noGrp="1"/>
+          </p:cNvSpPr>
+          <p:nvPr>
+            <p:ph idx="1"/>
+          </p:nvPr>
+        </p:nvSpPr>
+        <p:spPr/>
+        <p:txBody>
+          <a:bodyPr/>
+          <a:lstStyle/>
+          <a:p>
+            <a:r>
+              <a:rPr lang="en-US" dirty="0" smtClean="0"/>
+              <a:t>Expanding and extending the functionality of the API can be difficult, server can store what available commands exist for a certain device, but the user interface cannot dynamically translate commands into a practical layout </a:t>
+            </a:r>
+          </a:p>
+          <a:p>
+            <a:endParaRPr lang="en-US" dirty="0"/>
+          </a:p>
+        </p:txBody>
+      </p:sp>
+      <p:sp>
+        <p:nvSpPr>
+          <p:cNvPr id="3" name="Title 2"/>
+          <p:cNvSpPr>
+            <a:spLocks noGrp="1"/>
+          </p:cNvSpPr>
+          <p:nvPr>
+            <p:ph type="title"/>
+          </p:nvPr>
+        </p:nvSpPr>
+        <p:spPr/>
+        <p:txBody>
+          <a:bodyPr/>
+          <a:lstStyle/>
+          <a:p>
+            <a:r>
+              <a:rPr lang="en-US" dirty="0" smtClean="0"/>
+              <a:t>Server Issues</a:t>
+            </a:r>
+            <a:endParaRPr lang="en-US" dirty="0"/>
+          </a:p>
+        </p:txBody>
+      </p:sp>
+    </p:spTree>
+    <p:extLst>
+      <p:ext uri="{BB962C8B-B14F-4D97-AF65-F5344CB8AC3E}">
+        <p14:creationId xmlns:p14="http://schemas.microsoft.com/office/powerpoint/2010/main" val="162141028"/>
       </p:ext>
     </p:extLst>
   </p:cSld>

</xml_diff>